<commit_message>
Adding the java probe example to the presentation
</commit_message>
<xml_diff>
--- a/documents/ATMOSPHERE_TMA_Framework_usage.pptx
+++ b/documents/ATMOSPHERE_TMA_Framework_usage.pptx
@@ -5,7 +5,7 @@
     <p:sldMasterId id="2147483664" r:id="rId1"/>
   </p:sldMasterIdLst>
   <p:notesMasterIdLst>
-    <p:notesMasterId r:id="rId36"/>
+    <p:notesMasterId r:id="rId37"/>
   </p:notesMasterIdLst>
   <p:sldIdLst>
     <p:sldId id="262" r:id="rId2"/>
@@ -34,14 +34,15 @@
     <p:sldId id="288" r:id="rId25"/>
     <p:sldId id="289" r:id="rId26"/>
     <p:sldId id="297" r:id="rId27"/>
-    <p:sldId id="290" r:id="rId28"/>
-    <p:sldId id="291" r:id="rId29"/>
-    <p:sldId id="292" r:id="rId30"/>
-    <p:sldId id="293" r:id="rId31"/>
-    <p:sldId id="294" r:id="rId32"/>
-    <p:sldId id="295" r:id="rId33"/>
-    <p:sldId id="296" r:id="rId34"/>
-    <p:sldId id="264" r:id="rId35"/>
+    <p:sldId id="298" r:id="rId28"/>
+    <p:sldId id="290" r:id="rId29"/>
+    <p:sldId id="291" r:id="rId30"/>
+    <p:sldId id="292" r:id="rId31"/>
+    <p:sldId id="293" r:id="rId32"/>
+    <p:sldId id="294" r:id="rId33"/>
+    <p:sldId id="295" r:id="rId34"/>
+    <p:sldId id="296" r:id="rId35"/>
+    <p:sldId id="264" r:id="rId36"/>
   </p:sldIdLst>
   <p:sldSz cx="9144000" cy="6858000" type="screen4x3"/>
   <p:notesSz cx="6858000" cy="9144000"/>
@@ -157,15 +158,6 @@
     </p:ext>
   </p:extLst>
 </p:presentation>
-</file>
-
-<file path=ppt/revisionInfo.xml><?xml version="1.0" encoding="utf-8"?>
-<p1510:revInfo xmlns:a="http://schemas.openxmlformats.org/drawingml/2006/main" xmlns:r="http://schemas.openxmlformats.org/officeDocument/2006/relationships" xmlns:p1510="http://schemas.microsoft.com/office/powerpoint/2015/10/main">
-  <p1510:revLst>
-    <p1510:client id="{566E6ACB-294A-440D-A928-836B46D2CF0B}" v="3" dt="2018-09-14T15:44:52.587"/>
-    <p1510:client id="{448F7E57-ADE2-46A5-962E-D2090AD28586}" v="4" dt="2018-09-12T16:09:55.527"/>
-  </p1510:revLst>
-</p1510:revInfo>
 </file>
 
 <file path=ppt/changesInfos/changesInfo1.xml><?xml version="1.0" encoding="utf-8"?>
@@ -744,7 +736,7 @@
           <a:p>
             <a:fld id="{AA148A20-7C99-4A4D-BF06-6E8ADEA4D03E}" type="slidenum">
               <a:rPr lang="it-IT" smtClean="0"/>
-              <a:t>‹#›</a:t>
+              <a:t>‹nº›</a:t>
             </a:fld>
             <a:endParaRPr lang="it-IT"/>
           </a:p>
@@ -1320,7 +1312,7 @@
             <a:fld id="{B6F15528-21DE-4FAA-801E-634DDDAF4B2B}" type="slidenum">
               <a:rPr lang="en-US" smtClean="0"/>
               <a:pPr/>
-              <a:t>‹#›</a:t>
+              <a:t>‹nº›</a:t>
             </a:fld>
             <a:endParaRPr lang="en-US"/>
           </a:p>
@@ -1528,7 +1520,7 @@
             <a:fld id="{B6F15528-21DE-4FAA-801E-634DDDAF4B2B}" type="slidenum">
               <a:rPr lang="en-US" smtClean="0"/>
               <a:pPr/>
-              <a:t>‹#›</a:t>
+              <a:t>‹nº›</a:t>
             </a:fld>
             <a:endParaRPr lang="en-US"/>
           </a:p>
@@ -2153,7 +2145,7 @@
             <a:fld id="{B6F15528-21DE-4FAA-801E-634DDDAF4B2B}" type="slidenum">
               <a:rPr lang="en-US" smtClean="0"/>
               <a:pPr/>
-              <a:t>‹#›</a:t>
+              <a:t>‹nº›</a:t>
             </a:fld>
             <a:endParaRPr lang="en-US"/>
           </a:p>
@@ -2901,7 +2893,7 @@
             <a:fld id="{B6F15528-21DE-4FAA-801E-634DDDAF4B2B}" type="slidenum">
               <a:rPr lang="en-US" smtClean="0"/>
               <a:pPr/>
-              <a:t>‹#›</a:t>
+              <a:t>‹nº›</a:t>
             </a:fld>
             <a:endParaRPr lang="en-US"/>
           </a:p>
@@ -3436,7 +3428,7 @@
             <a:fld id="{B6F15528-21DE-4FAA-801E-634DDDAF4B2B}" type="slidenum">
               <a:rPr lang="en-US" smtClean="0"/>
               <a:pPr/>
-              <a:t>‹#›</a:t>
+              <a:t>‹nº›</a:t>
             </a:fld>
             <a:endParaRPr lang="en-US"/>
           </a:p>
@@ -8324,18 +8316,18 @@
           <a:lstStyle/>
           <a:p>
             <a:r>
-              <a:rPr lang="pt-PT" err="1"/>
+              <a:rPr lang="pt-PT" dirty="0" err="1"/>
               <a:t>Probe</a:t>
             </a:r>
             <a:r>
-              <a:rPr lang="pt-PT"/>
+              <a:rPr lang="pt-PT" dirty="0"/>
               <a:t> </a:t>
             </a:r>
             <a:r>
-              <a:rPr lang="pt-PT" err="1"/>
+              <a:rPr lang="pt-PT" dirty="0" err="1"/>
               <a:t>Development</a:t>
             </a:r>
-            <a:endParaRPr lang="pt-PT"/>
+            <a:endParaRPr lang="pt-PT" dirty="0"/>
           </a:p>
         </p:txBody>
       </p:sp>
@@ -8363,27 +8355,27 @@
               <a:buNone/>
             </a:pPr>
             <a:r>
-              <a:rPr lang="pt-PT" sz="1600" b="1" err="1"/>
+              <a:rPr lang="pt-PT" sz="1600" b="1" dirty="0" err="1"/>
               <a:t>Example</a:t>
             </a:r>
             <a:r>
-              <a:rPr lang="pt-PT" sz="1600" b="1"/>
+              <a:rPr lang="pt-PT" sz="1600" b="1" dirty="0"/>
               <a:t>: </a:t>
             </a:r>
             <a:r>
-              <a:rPr lang="pt-PT" sz="1600" b="1" err="1"/>
+              <a:rPr lang="pt-PT" sz="1600" b="1" dirty="0" err="1"/>
               <a:t>Probe</a:t>
             </a:r>
             <a:r>
-              <a:rPr lang="pt-PT" sz="1600" b="1"/>
+              <a:rPr lang="pt-PT" sz="1600" b="1" dirty="0"/>
               <a:t> </a:t>
             </a:r>
             <a:r>
-              <a:rPr lang="pt-PT" sz="1600" b="1" err="1"/>
+              <a:rPr lang="pt-PT" sz="1600" b="1" dirty="0" err="1"/>
               <a:t>Python</a:t>
             </a:r>
             <a:r>
-              <a:rPr lang="pt-PT" sz="1600" b="1"/>
+              <a:rPr lang="pt-PT" sz="1600" b="1" dirty="0"/>
               <a:t> Demo</a:t>
             </a:r>
           </a:p>
@@ -8391,12 +8383,12 @@
             <a:pPr marL="0" indent="0">
               <a:buNone/>
             </a:pPr>
-            <a:endParaRPr lang="pt-PT" sz="1600" b="1"/>
+            <a:endParaRPr lang="pt-PT" sz="1600" b="1" dirty="0"/>
           </a:p>
           <a:p>
             <a:pPr fontAlgn="base"/>
             <a:r>
-              <a:rPr lang="en-US" sz="1600"/>
+              <a:rPr lang="en-US" sz="1600" dirty="0"/>
               <a:t>For testing purposes, execute an Apache Kafka consumer in Apache Kafka pod:</a:t>
             </a:r>
           </a:p>
@@ -8404,32 +8396,32 @@
             <a:pPr marL="0" indent="0" fontAlgn="base">
               <a:buNone/>
             </a:pPr>
-            <a:endParaRPr lang="en-US" sz="1600"/>
+            <a:endParaRPr lang="en-US" sz="1600" dirty="0"/>
           </a:p>
           <a:p>
             <a:pPr fontAlgn="base"/>
             <a:r>
-              <a:rPr lang="pt-PT" sz="1600" err="1"/>
+              <a:rPr lang="pt-PT" sz="1600" dirty="0" err="1"/>
               <a:t>The</a:t>
             </a:r>
             <a:r>
-              <a:rPr lang="pt-PT" sz="1600"/>
+              <a:rPr lang="pt-PT" sz="1600" dirty="0"/>
               <a:t> data </a:t>
             </a:r>
             <a:r>
-              <a:rPr lang="pt-PT" sz="1600" err="1"/>
+              <a:rPr lang="pt-PT" sz="1600" dirty="0" err="1"/>
               <a:t>is</a:t>
             </a:r>
             <a:r>
-              <a:rPr lang="pt-PT" sz="1600"/>
+              <a:rPr lang="pt-PT" sz="1600" dirty="0"/>
               <a:t> </a:t>
             </a:r>
             <a:r>
-              <a:rPr lang="pt-PT" sz="1600" err="1"/>
+              <a:rPr lang="pt-PT" sz="1600" dirty="0" err="1"/>
               <a:t>received</a:t>
             </a:r>
             <a:r>
-              <a:rPr lang="pt-PT" sz="1600"/>
+              <a:rPr lang="pt-PT" sz="1600" dirty="0"/>
               <a:t>:</a:t>
             </a:r>
           </a:p>
@@ -8437,59 +8429,59 @@
             <a:pPr marL="0" indent="0" fontAlgn="base">
               <a:buNone/>
             </a:pPr>
-            <a:endParaRPr lang="en-US" sz="1600"/>
+            <a:endParaRPr lang="en-US" sz="1600" dirty="0"/>
           </a:p>
           <a:p>
             <a:pPr marL="0" indent="0" fontAlgn="base">
               <a:buNone/>
             </a:pPr>
-            <a:endParaRPr lang="en-US" sz="1600"/>
+            <a:endParaRPr lang="en-US" sz="1600" dirty="0"/>
           </a:p>
           <a:p>
             <a:pPr fontAlgn="base"/>
-            <a:endParaRPr lang="en-US" sz="1600"/>
+            <a:endParaRPr lang="en-US" sz="1600" dirty="0"/>
           </a:p>
           <a:p>
             <a:pPr marL="0" indent="0" fontAlgn="base">
               <a:buNone/>
             </a:pPr>
-            <a:endParaRPr lang="en-US" sz="1600"/>
+            <a:endParaRPr lang="en-US" sz="1600" dirty="0"/>
           </a:p>
           <a:p>
             <a:pPr fontAlgn="base"/>
-            <a:endParaRPr lang="en-US" sz="1600"/>
+            <a:endParaRPr lang="en-US" sz="1600" dirty="0"/>
           </a:p>
           <a:p>
             <a:pPr fontAlgn="base"/>
-            <a:endParaRPr lang="en-US" sz="1600"/>
+            <a:endParaRPr lang="en-US" sz="1600" dirty="0"/>
           </a:p>
           <a:p>
             <a:pPr fontAlgn="base"/>
-            <a:endParaRPr lang="en-US" sz="1600"/>
+            <a:endParaRPr lang="en-US" sz="1600" dirty="0"/>
           </a:p>
           <a:p>
             <a:pPr fontAlgn="base"/>
-            <a:endParaRPr lang="en-US" sz="1600"/>
+            <a:endParaRPr lang="en-US" sz="1600" dirty="0"/>
           </a:p>
           <a:p>
             <a:pPr fontAlgn="base"/>
-            <a:endParaRPr lang="en-US" sz="1600"/>
+            <a:endParaRPr lang="en-US" sz="1600" dirty="0"/>
           </a:p>
           <a:p>
             <a:pPr fontAlgn="base"/>
-            <a:endParaRPr lang="en-US" sz="1600"/>
+            <a:endParaRPr lang="en-US" sz="1600" dirty="0"/>
           </a:p>
           <a:p>
             <a:pPr fontAlgn="base"/>
-            <a:endParaRPr lang="en-US" sz="1600"/>
+            <a:endParaRPr lang="en-US" sz="1600" dirty="0"/>
           </a:p>
           <a:p>
             <a:pPr fontAlgn="base"/>
-            <a:endParaRPr lang="en-US" sz="1600"/>
+            <a:endParaRPr lang="en-US" sz="1600" dirty="0"/>
           </a:p>
           <a:p>
             <a:pPr fontAlgn="base"/>
-            <a:endParaRPr lang="en-US" sz="1600"/>
+            <a:endParaRPr lang="en-US" sz="1600" dirty="0"/>
           </a:p>
         </p:txBody>
       </p:sp>
@@ -8626,7 +8618,261 @@
           <a:bodyPr/>
           <a:lstStyle/>
           <a:p>
-            <a:endParaRPr lang="en-US"/>
+            <a:pPr marL="0" indent="0">
+              <a:buNone/>
+            </a:pPr>
+            <a:r>
+              <a:rPr lang="pt-PT" sz="1400" b="1" dirty="0" err="1"/>
+              <a:t>Example</a:t>
+            </a:r>
+            <a:r>
+              <a:rPr lang="pt-PT" sz="1400" b="1" dirty="0"/>
+              <a:t>: </a:t>
+            </a:r>
+            <a:r>
+              <a:rPr lang="pt-PT" sz="1400" b="1" dirty="0" err="1"/>
+              <a:t>Probe</a:t>
+            </a:r>
+            <a:r>
+              <a:rPr lang="pt-PT" sz="1400" b="1" dirty="0"/>
+              <a:t> Java Demo</a:t>
+            </a:r>
+          </a:p>
+          <a:p>
+            <a:pPr marL="0" indent="0">
+              <a:buNone/>
+            </a:pPr>
+            <a:endParaRPr lang="pt-PT" sz="1400" b="1" dirty="0"/>
+          </a:p>
+          <a:p>
+            <a:pPr fontAlgn="base"/>
+            <a:r>
+              <a:rPr lang="pt-PT" sz="1400" dirty="0" err="1"/>
+              <a:t>The</a:t>
+            </a:r>
+            <a:r>
+              <a:rPr lang="pt-PT" sz="1400" dirty="0"/>
+              <a:t> </a:t>
+            </a:r>
+            <a:r>
+              <a:rPr lang="pt-PT" sz="1400" dirty="0" err="1"/>
+              <a:t>development</a:t>
+            </a:r>
+            <a:r>
+              <a:rPr lang="pt-PT" sz="1400" dirty="0"/>
+              <a:t> </a:t>
+            </a:r>
+            <a:r>
+              <a:rPr lang="pt-PT" sz="1400" dirty="0" err="1"/>
+              <a:t>of</a:t>
+            </a:r>
+            <a:r>
+              <a:rPr lang="pt-PT" sz="1400" dirty="0"/>
+              <a:t> Java </a:t>
+            </a:r>
+            <a:r>
+              <a:rPr lang="pt-PT" sz="1400" dirty="0" err="1"/>
+              <a:t>probes</a:t>
+            </a:r>
+            <a:r>
+              <a:rPr lang="pt-PT" sz="1400" dirty="0"/>
+              <a:t> can </a:t>
+            </a:r>
+            <a:r>
+              <a:rPr lang="pt-PT" sz="1400" dirty="0" err="1"/>
+              <a:t>be</a:t>
+            </a:r>
+            <a:r>
+              <a:rPr lang="pt-PT" sz="1400" dirty="0"/>
+              <a:t> </a:t>
+            </a:r>
+            <a:r>
+              <a:rPr lang="pt-PT" sz="1400" dirty="0" err="1"/>
+              <a:t>done</a:t>
+            </a:r>
+            <a:r>
+              <a:rPr lang="pt-PT" sz="1400" dirty="0"/>
+              <a:t> </a:t>
+            </a:r>
+            <a:r>
+              <a:rPr lang="pt-PT" sz="1400" dirty="0" err="1"/>
+              <a:t>by</a:t>
+            </a:r>
+            <a:r>
+              <a:rPr lang="pt-PT" sz="1400" dirty="0"/>
+              <a:t> </a:t>
+            </a:r>
+            <a:r>
+              <a:rPr lang="pt-PT" sz="1400" dirty="0" err="1"/>
+              <a:t>using</a:t>
+            </a:r>
+            <a:r>
+              <a:rPr lang="pt-PT" sz="1400" dirty="0"/>
+              <a:t> a </a:t>
+            </a:r>
+            <a:r>
+              <a:rPr lang="pt-PT" sz="1400" dirty="0" err="1"/>
+              <a:t>library</a:t>
+            </a:r>
+            <a:r>
+              <a:rPr lang="pt-PT" sz="1400" dirty="0"/>
+              <a:t> </a:t>
+            </a:r>
+            <a:r>
+              <a:rPr lang="pt-PT" sz="1400" dirty="0" err="1"/>
+              <a:t>which</a:t>
+            </a:r>
+            <a:r>
+              <a:rPr lang="pt-PT" sz="1400" dirty="0"/>
+              <a:t> </a:t>
+            </a:r>
+            <a:r>
+              <a:rPr lang="pt-PT" sz="1400" dirty="0" err="1"/>
+              <a:t>is</a:t>
+            </a:r>
+            <a:r>
+              <a:rPr lang="pt-PT" sz="1400" dirty="0"/>
+              <a:t> </a:t>
+            </a:r>
+            <a:r>
+              <a:rPr lang="pt-PT" sz="1400" dirty="0" err="1"/>
+              <a:t>available</a:t>
+            </a:r>
+            <a:r>
+              <a:rPr lang="pt-PT" sz="1400" dirty="0"/>
+              <a:t> </a:t>
+            </a:r>
+            <a:r>
+              <a:rPr lang="pt-PT" sz="1400" dirty="0" err="1"/>
+              <a:t>through</a:t>
+            </a:r>
+            <a:r>
+              <a:rPr lang="pt-PT" sz="1400" dirty="0"/>
+              <a:t> </a:t>
+            </a:r>
+            <a:r>
+              <a:rPr lang="pt-PT" sz="1400" dirty="0" err="1"/>
+              <a:t>Maven</a:t>
+            </a:r>
+            <a:r>
+              <a:rPr lang="pt-PT" sz="1400" dirty="0"/>
+              <a:t>:</a:t>
+            </a:r>
+          </a:p>
+          <a:p>
+            <a:pPr marL="0" indent="0" fontAlgn="base">
+              <a:buNone/>
+            </a:pPr>
+            <a:endParaRPr lang="pt-PT" sz="1400" dirty="0"/>
+          </a:p>
+          <a:p>
+            <a:pPr marL="0" indent="0" fontAlgn="base">
+              <a:buNone/>
+            </a:pPr>
+            <a:endParaRPr lang="pt-PT" sz="1400" dirty="0"/>
+          </a:p>
+          <a:p>
+            <a:pPr marL="0" indent="0" fontAlgn="base">
+              <a:buNone/>
+            </a:pPr>
+            <a:r>
+              <a:rPr lang="pt-PT" sz="1400" dirty="0"/>
+              <a:t> </a:t>
+            </a:r>
+            <a:r>
+              <a:rPr lang="pt-PT" sz="1400" dirty="0" err="1"/>
+              <a:t>Reference</a:t>
+            </a:r>
+            <a:r>
+              <a:rPr lang="pt-PT" sz="1400" dirty="0"/>
+              <a:t>: </a:t>
+            </a:r>
+            <a:r>
+              <a:rPr lang="pt-PT" sz="1400" dirty="0">
+                <a:hlinkClick r:id="rId2"/>
+              </a:rPr>
+              <a:t>https://github.com/eubr-atmosphere/tma-framework-m/tree/master/development/libraries</a:t>
+            </a:r>
+            <a:endParaRPr lang="pt-PT" sz="1400" dirty="0"/>
+          </a:p>
+          <a:p>
+            <a:pPr fontAlgn="base"/>
+            <a:endParaRPr lang="pt-PT" sz="1400" dirty="0"/>
+          </a:p>
+          <a:p>
+            <a:pPr fontAlgn="base"/>
+            <a:endParaRPr lang="pt-PT" sz="1400" dirty="0"/>
+          </a:p>
+          <a:p>
+            <a:pPr fontAlgn="base"/>
+            <a:r>
+              <a:rPr lang="pt-PT" sz="1400" dirty="0"/>
+              <a:t>To use </a:t>
+            </a:r>
+            <a:r>
+              <a:rPr lang="pt-PT" sz="1400" dirty="0" err="1"/>
+              <a:t>the</a:t>
+            </a:r>
+            <a:r>
+              <a:rPr lang="pt-PT" sz="1400" dirty="0"/>
+              <a:t> </a:t>
+            </a:r>
+            <a:r>
+              <a:rPr lang="pt-PT" sz="1400" dirty="0" err="1"/>
+              <a:t>library</a:t>
+            </a:r>
+            <a:r>
+              <a:rPr lang="pt-PT" sz="1400" dirty="0"/>
+              <a:t>, </a:t>
+            </a:r>
+            <a:r>
+              <a:rPr lang="pt-PT" sz="1400" dirty="0" err="1"/>
+              <a:t>add</a:t>
+            </a:r>
+            <a:r>
+              <a:rPr lang="pt-PT" sz="1400" dirty="0"/>
+              <a:t> </a:t>
+            </a:r>
+            <a:r>
+              <a:rPr lang="pt-PT" sz="1400" dirty="0" err="1"/>
+              <a:t>the</a:t>
+            </a:r>
+            <a:r>
+              <a:rPr lang="pt-PT" sz="1400" dirty="0"/>
+              <a:t> </a:t>
+            </a:r>
+            <a:r>
+              <a:rPr lang="pt-PT" sz="1400" dirty="0" err="1"/>
+              <a:t>following</a:t>
+            </a:r>
+            <a:r>
+              <a:rPr lang="pt-PT" sz="1400" dirty="0"/>
+              <a:t> </a:t>
+            </a:r>
+            <a:r>
+              <a:rPr lang="pt-PT" sz="1400" dirty="0" err="1"/>
+              <a:t>reference</a:t>
+            </a:r>
+            <a:r>
+              <a:rPr lang="pt-PT" sz="1400" dirty="0"/>
+              <a:t> to </a:t>
+            </a:r>
+            <a:r>
+              <a:rPr lang="pt-PT" sz="1400" dirty="0" err="1"/>
+              <a:t>the</a:t>
+            </a:r>
+            <a:r>
+              <a:rPr lang="pt-PT" sz="1400" dirty="0"/>
+              <a:t> </a:t>
+            </a:r>
+            <a:r>
+              <a:rPr lang="pt-PT" sz="1400" dirty="0" err="1"/>
+              <a:t>probe</a:t>
+            </a:r>
+            <a:r>
+              <a:rPr lang="pt-PT" sz="1400" dirty="0"/>
+              <a:t>:</a:t>
+            </a:r>
           </a:p>
         </p:txBody>
       </p:sp>
@@ -8711,17 +8957,102 @@
           <a:lstStyle/>
           <a:p>
             <a:r>
-              <a:rPr lang="en-US" dirty="0"/>
-              <a:t>TODO </a:t>
-            </a:r>
-            <a:r>
-              <a:rPr lang="en-US"/>
-              <a:t>java demo</a:t>
+              <a:rPr lang="pt-PT" dirty="0" err="1"/>
+              <a:t>Probe</a:t>
+            </a:r>
+            <a:r>
+              <a:rPr lang="pt-PT" dirty="0"/>
+              <a:t> </a:t>
+            </a:r>
+            <a:r>
+              <a:rPr lang="pt-PT" dirty="0" err="1"/>
+              <a:t>Development</a:t>
             </a:r>
             <a:endParaRPr lang="en-US" dirty="0"/>
           </a:p>
         </p:txBody>
       </p:sp>
+      <p:pic>
+        <p:nvPicPr>
+          <p:cNvPr id="7" name="Imagem 6">
+            <a:extLst>
+              <a:ext uri="{FF2B5EF4-FFF2-40B4-BE49-F238E27FC236}">
+                <a16:creationId xmlns:a16="http://schemas.microsoft.com/office/drawing/2014/main" id="{3A4D6BE8-D8F0-E043-B6AE-0499A4283F95}"/>
+              </a:ext>
+            </a:extLst>
+          </p:cNvPr>
+          <p:cNvPicPr>
+            <a:picLocks noChangeAspect="1"/>
+          </p:cNvPicPr>
+          <p:nvPr/>
+        </p:nvPicPr>
+        <p:blipFill rotWithShape="1">
+          <a:blip r:embed="rId3">
+            <a:extLst>
+              <a:ext uri="{28A0092B-C50C-407E-A947-70E740481C1C}">
+                <a14:useLocalDpi xmlns:a14="http://schemas.microsoft.com/office/drawing/2010/main" val="0"/>
+              </a:ext>
+            </a:extLst>
+          </a:blip>
+          <a:srcRect r="6759"/>
+          <a:stretch/>
+        </p:blipFill>
+        <p:spPr>
+          <a:xfrm>
+            <a:off x="2132623" y="4349539"/>
+            <a:ext cx="4878754" cy="1409700"/>
+          </a:xfrm>
+          <a:prstGeom prst="rect">
+            <a:avLst/>
+          </a:prstGeom>
+          <a:ln>
+            <a:solidFill>
+              <a:schemeClr val="tx1"/>
+            </a:solidFill>
+          </a:ln>
+        </p:spPr>
+      </p:pic>
+      <p:pic>
+        <p:nvPicPr>
+          <p:cNvPr id="9" name="Imagem 8">
+            <a:extLst>
+              <a:ext uri="{FF2B5EF4-FFF2-40B4-BE49-F238E27FC236}">
+                <a16:creationId xmlns:a16="http://schemas.microsoft.com/office/drawing/2014/main" id="{D580984E-4E63-2B44-9ABA-3584DC67FD2B}"/>
+              </a:ext>
+            </a:extLst>
+          </p:cNvPr>
+          <p:cNvPicPr>
+            <a:picLocks noChangeAspect="1"/>
+          </p:cNvPicPr>
+          <p:nvPr/>
+        </p:nvPicPr>
+        <p:blipFill>
+          <a:blip r:embed="rId4">
+            <a:extLst>
+              <a:ext uri="{28A0092B-C50C-407E-A947-70E740481C1C}">
+                <a14:useLocalDpi xmlns:a14="http://schemas.microsoft.com/office/drawing/2010/main" val="0"/>
+              </a:ext>
+            </a:extLst>
+          </a:blip>
+          <a:stretch>
+            <a:fillRect/>
+          </a:stretch>
+        </p:blipFill>
+        <p:spPr>
+          <a:xfrm>
+            <a:off x="3467100" y="2654778"/>
+            <a:ext cx="2209800" cy="406400"/>
+          </a:xfrm>
+          <a:prstGeom prst="rect">
+            <a:avLst/>
+          </a:prstGeom>
+          <a:ln>
+            <a:solidFill>
+              <a:schemeClr val="tx1"/>
+            </a:solidFill>
+          </a:ln>
+        </p:spPr>
+      </p:pic>
     </p:spTree>
     <p:extLst>
       <p:ext uri="{BB962C8B-B14F-4D97-AF65-F5344CB8AC3E}">
@@ -8754,7 +9085,145 @@
       </p:grpSpPr>
       <p:sp>
         <p:nvSpPr>
-          <p:cNvPr id="3" name="Marcador de Posição da Data 2"/>
+          <p:cNvPr id="2" name="Content Placeholder 1">
+            <a:extLst>
+              <a:ext uri="{FF2B5EF4-FFF2-40B4-BE49-F238E27FC236}">
+                <a16:creationId xmlns:a16="http://schemas.microsoft.com/office/drawing/2014/main" id="{0E4E79BB-4D8D-CE43-ACDF-8AB49CE2CF08}"/>
+              </a:ext>
+            </a:extLst>
+          </p:cNvPr>
+          <p:cNvSpPr>
+            <a:spLocks noGrp="1"/>
+          </p:cNvSpPr>
+          <p:nvPr>
+            <p:ph idx="1"/>
+          </p:nvPr>
+        </p:nvSpPr>
+        <p:spPr/>
+        <p:txBody>
+          <a:bodyPr/>
+          <a:lstStyle/>
+          <a:p>
+            <a:pPr marL="0" indent="0">
+              <a:buNone/>
+            </a:pPr>
+            <a:r>
+              <a:rPr lang="pt-PT" sz="1400" b="1" dirty="0" err="1"/>
+              <a:t>Example</a:t>
+            </a:r>
+            <a:r>
+              <a:rPr lang="pt-PT" sz="1400" b="1" dirty="0"/>
+              <a:t>: </a:t>
+            </a:r>
+            <a:r>
+              <a:rPr lang="pt-PT" sz="1400" b="1" dirty="0" err="1"/>
+              <a:t>Probe</a:t>
+            </a:r>
+            <a:r>
+              <a:rPr lang="pt-PT" sz="1400" b="1" dirty="0"/>
+              <a:t> Java Demo</a:t>
+            </a:r>
+          </a:p>
+          <a:p>
+            <a:pPr marL="0" indent="0">
+              <a:buNone/>
+            </a:pPr>
+            <a:endParaRPr lang="pt-PT" sz="1400" b="1" dirty="0"/>
+          </a:p>
+          <a:p>
+            <a:pPr fontAlgn="base"/>
+            <a:r>
+              <a:rPr lang="pt-PT" sz="1400" dirty="0" err="1"/>
+              <a:t>The</a:t>
+            </a:r>
+            <a:r>
+              <a:rPr lang="pt-PT" sz="1400" dirty="0"/>
+              <a:t> </a:t>
+            </a:r>
+            <a:r>
+              <a:rPr lang="pt-PT" sz="1400" dirty="0" err="1"/>
+              <a:t>following</a:t>
+            </a:r>
+            <a:r>
+              <a:rPr lang="pt-PT" sz="1400" dirty="0"/>
+              <a:t> java </a:t>
+            </a:r>
+            <a:r>
+              <a:rPr lang="pt-PT" sz="1400" dirty="0" err="1"/>
+              <a:t>code</a:t>
+            </a:r>
+            <a:r>
+              <a:rPr lang="pt-PT" sz="1400" dirty="0"/>
+              <a:t> </a:t>
+            </a:r>
+            <a:r>
+              <a:rPr lang="pt-PT" sz="1400" dirty="0" err="1"/>
+              <a:t>starts</a:t>
+            </a:r>
+            <a:r>
+              <a:rPr lang="pt-PT" sz="1400" dirty="0"/>
+              <a:t> a </a:t>
+            </a:r>
+            <a:r>
+              <a:rPr lang="pt-PT" sz="1400" dirty="0" err="1"/>
+              <a:t>client</a:t>
+            </a:r>
+            <a:r>
+              <a:rPr lang="pt-PT" sz="1400" dirty="0"/>
+              <a:t>, </a:t>
+            </a:r>
+            <a:r>
+              <a:rPr lang="pt-PT" sz="1400" dirty="0" err="1"/>
+              <a:t>and</a:t>
+            </a:r>
+            <a:r>
+              <a:rPr lang="pt-PT" sz="1400" dirty="0"/>
+              <a:t> </a:t>
+            </a:r>
+            <a:r>
+              <a:rPr lang="pt-PT" sz="1400" dirty="0" err="1"/>
+              <a:t>send</a:t>
+            </a:r>
+            <a:r>
+              <a:rPr lang="pt-PT" sz="1400" dirty="0"/>
+              <a:t> </a:t>
+            </a:r>
+            <a:r>
+              <a:rPr lang="pt-PT" sz="1400" dirty="0" err="1"/>
+              <a:t>the</a:t>
+            </a:r>
+            <a:r>
+              <a:rPr lang="pt-PT" sz="1400" dirty="0"/>
+              <a:t> </a:t>
+            </a:r>
+            <a:r>
+              <a:rPr lang="pt-PT" sz="1400" dirty="0" err="1"/>
+              <a:t>measurements</a:t>
+            </a:r>
+            <a:r>
+              <a:rPr lang="pt-PT" sz="1400" dirty="0"/>
+              <a:t> to </a:t>
+            </a:r>
+            <a:r>
+              <a:rPr lang="pt-PT" sz="1400" dirty="0" err="1"/>
+              <a:t>the</a:t>
+            </a:r>
+            <a:r>
+              <a:rPr lang="pt-PT" sz="1400" dirty="0"/>
+              <a:t> monitor</a:t>
+            </a:r>
+          </a:p>
+        </p:txBody>
+      </p:sp>
+      <p:sp>
+        <p:nvSpPr>
+          <p:cNvPr id="3" name="Date Placeholder 2">
+            <a:extLst>
+              <a:ext uri="{FF2B5EF4-FFF2-40B4-BE49-F238E27FC236}">
+                <a16:creationId xmlns:a16="http://schemas.microsoft.com/office/drawing/2014/main" id="{A349400B-3130-0744-9654-D08618C8589C}"/>
+              </a:ext>
+            </a:extLst>
+          </p:cNvPr>
           <p:cNvSpPr>
             <a:spLocks noGrp="1"/>
           </p:cNvSpPr>
@@ -8767,7 +9236,7 @@
           <a:bodyPr/>
           <a:lstStyle/>
           <a:p>
-            <a:fld id="{739B5859-568F-4FD8-B4E3-F5DED0E25631}" type="datetime1">
+            <a:fld id="{9F72D088-E9AC-0049-ACFB-7F9F1D8E616E}" type="datetime1">
               <a:rPr lang="en-US" smtClean="0"/>
               <a:t>9/17/18</a:t>
             </a:fld>
@@ -8777,7 +9246,13 @@
       </p:sp>
       <p:sp>
         <p:nvSpPr>
-          <p:cNvPr id="4" name="Marcador de Posição do Número do Diapositivo 3"/>
+          <p:cNvPr id="4" name="Slide Number Placeholder 3">
+            <a:extLst>
+              <a:ext uri="{FF2B5EF4-FFF2-40B4-BE49-F238E27FC236}">
+                <a16:creationId xmlns:a16="http://schemas.microsoft.com/office/drawing/2014/main" id="{3FBE17DB-BD1D-AE46-9B37-35605BCF654B}"/>
+              </a:ext>
+            </a:extLst>
+          </p:cNvPr>
           <p:cNvSpPr>
             <a:spLocks noGrp="1"/>
           </p:cNvSpPr>
@@ -8801,87 +9276,86 @@
       </p:sp>
       <p:sp>
         <p:nvSpPr>
-          <p:cNvPr id="6" name="Retângulo 5"/>
-          <p:cNvSpPr/>
+          <p:cNvPr id="5" name="Title 4">
+            <a:extLst>
+              <a:ext uri="{FF2B5EF4-FFF2-40B4-BE49-F238E27FC236}">
+                <a16:creationId xmlns:a16="http://schemas.microsoft.com/office/drawing/2014/main" id="{90C4DFB5-F43B-3A47-9E1D-15AC2184514C}"/>
+              </a:ext>
+            </a:extLst>
+          </p:cNvPr>
+          <p:cNvSpPr>
+            <a:spLocks noGrp="1"/>
+          </p:cNvSpPr>
+          <p:nvPr>
+            <p:ph type="title"/>
+          </p:nvPr>
+        </p:nvSpPr>
+        <p:spPr/>
+        <p:txBody>
+          <a:bodyPr/>
+          <a:lstStyle/>
+          <a:p>
+            <a:r>
+              <a:rPr lang="pt-PT" dirty="0" err="1"/>
+              <a:t>Probe</a:t>
+            </a:r>
+            <a:r>
+              <a:rPr lang="pt-PT" dirty="0"/>
+              <a:t> </a:t>
+            </a:r>
+            <a:r>
+              <a:rPr lang="pt-PT" dirty="0" err="1"/>
+              <a:t>Development</a:t>
+            </a:r>
+            <a:endParaRPr lang="en-US" dirty="0"/>
+          </a:p>
+        </p:txBody>
+      </p:sp>
+      <p:pic>
+        <p:nvPicPr>
+          <p:cNvPr id="8" name="Imagem 7">
+            <a:extLst>
+              <a:ext uri="{FF2B5EF4-FFF2-40B4-BE49-F238E27FC236}">
+                <a16:creationId xmlns:a16="http://schemas.microsoft.com/office/drawing/2014/main" id="{FD9AEBAD-D627-C240-B74C-06AC4D3CF747}"/>
+              </a:ext>
+            </a:extLst>
+          </p:cNvPr>
+          <p:cNvPicPr>
+            <a:picLocks noChangeAspect="1"/>
+          </p:cNvPicPr>
           <p:nvPr/>
-        </p:nvSpPr>
+        </p:nvPicPr>
+        <p:blipFill>
+          <a:blip r:embed="rId2">
+            <a:extLst>
+              <a:ext uri="{28A0092B-C50C-407E-A947-70E740481C1C}">
+                <a14:useLocalDpi xmlns:a14="http://schemas.microsoft.com/office/drawing/2010/main" val="0"/>
+              </a:ext>
+            </a:extLst>
+          </a:blip>
+          <a:stretch>
+            <a:fillRect/>
+          </a:stretch>
+        </p:blipFill>
         <p:spPr>
           <a:xfrm>
-            <a:off x="662121" y="3075057"/>
-            <a:ext cx="7819769" cy="707886"/>
+            <a:off x="2317750" y="2815370"/>
+            <a:ext cx="4508500" cy="2882900"/>
           </a:xfrm>
           <a:prstGeom prst="rect">
             <a:avLst/>
           </a:prstGeom>
+          <a:ln>
+            <a:solidFill>
+              <a:schemeClr val="tx1"/>
+            </a:solidFill>
+          </a:ln>
         </p:spPr>
-        <p:txBody>
-          <a:bodyPr wrap="none">
-            <a:spAutoFit/>
-          </a:bodyPr>
-          <a:lstStyle/>
-          <a:p>
-            <a:pPr marL="742950" lvl="0" indent="-742950" algn="ctr" fontAlgn="base">
-              <a:buFont typeface="+mj-lt"/>
-              <a:buAutoNum type="arabicPeriod" startAt="5"/>
-            </a:pPr>
-            <a:r>
-              <a:rPr lang="pt-PT" sz="4000" err="1">
-                <a:solidFill>
-                  <a:srgbClr val="262626"/>
-                </a:solidFill>
-                <a:latin typeface="Century Gothic" panose="020B0502020202020204" pitchFamily="34" charset="0"/>
-              </a:rPr>
-              <a:t>Container</a:t>
-            </a:r>
-            <a:r>
-              <a:rPr lang="pt-PT" sz="4000">
-                <a:solidFill>
-                  <a:srgbClr val="262626"/>
-                </a:solidFill>
-                <a:latin typeface="Century Gothic" panose="020B0502020202020204" pitchFamily="34" charset="0"/>
-              </a:rPr>
-              <a:t> </a:t>
-            </a:r>
-            <a:r>
-              <a:rPr lang="pt-PT" sz="4000" err="1">
-                <a:solidFill>
-                  <a:srgbClr val="262626"/>
-                </a:solidFill>
-                <a:latin typeface="Century Gothic" panose="020B0502020202020204" pitchFamily="34" charset="0"/>
-              </a:rPr>
-              <a:t>Metrics</a:t>
-            </a:r>
-            <a:r>
-              <a:rPr lang="pt-PT" sz="4000">
-                <a:solidFill>
-                  <a:srgbClr val="262626"/>
-                </a:solidFill>
-                <a:latin typeface="Century Gothic" panose="020B0502020202020204" pitchFamily="34" charset="0"/>
-              </a:rPr>
-              <a:t> </a:t>
-            </a:r>
-            <a:r>
-              <a:rPr lang="pt-PT" sz="4000" err="1">
-                <a:solidFill>
-                  <a:srgbClr val="262626"/>
-                </a:solidFill>
-                <a:latin typeface="Century Gothic" panose="020B0502020202020204" pitchFamily="34" charset="0"/>
-              </a:rPr>
-              <a:t>Reported</a:t>
-            </a:r>
-            <a:endParaRPr lang="pt-PT" sz="4000">
-              <a:solidFill>
-                <a:srgbClr val="A53010"/>
-              </a:solidFill>
-              <a:latin typeface="Century Gothic" panose="020B0502020202020204" pitchFamily="34" charset="0"/>
-            </a:endParaRPr>
-          </a:p>
-        </p:txBody>
-      </p:sp>
+      </p:pic>
     </p:spTree>
     <p:extLst>
       <p:ext uri="{BB962C8B-B14F-4D97-AF65-F5344CB8AC3E}">
-        <p14:creationId xmlns:p14="http://schemas.microsoft.com/office/powerpoint/2010/main" val="3525021425"/>
+        <p14:creationId xmlns:p14="http://schemas.microsoft.com/office/powerpoint/2010/main" val="564543967"/>
       </p:ext>
     </p:extLst>
   </p:cSld>
@@ -8910,6 +9384,162 @@
       </p:grpSpPr>
       <p:sp>
         <p:nvSpPr>
+          <p:cNvPr id="3" name="Marcador de Posição da Data 2"/>
+          <p:cNvSpPr>
+            <a:spLocks noGrp="1"/>
+          </p:cNvSpPr>
+          <p:nvPr>
+            <p:ph type="dt" sz="half" idx="10"/>
+          </p:nvPr>
+        </p:nvSpPr>
+        <p:spPr/>
+        <p:txBody>
+          <a:bodyPr/>
+          <a:lstStyle/>
+          <a:p>
+            <a:fld id="{739B5859-568F-4FD8-B4E3-F5DED0E25631}" type="datetime1">
+              <a:rPr lang="en-US" smtClean="0"/>
+              <a:t>9/17/18</a:t>
+            </a:fld>
+            <a:endParaRPr lang="en-US"/>
+          </a:p>
+        </p:txBody>
+      </p:sp>
+      <p:sp>
+        <p:nvSpPr>
+          <p:cNvPr id="4" name="Marcador de Posição do Número do Diapositivo 3"/>
+          <p:cNvSpPr>
+            <a:spLocks noGrp="1"/>
+          </p:cNvSpPr>
+          <p:nvPr>
+            <p:ph type="sldNum" sz="quarter" idx="12"/>
+          </p:nvPr>
+        </p:nvSpPr>
+        <p:spPr/>
+        <p:txBody>
+          <a:bodyPr/>
+          <a:lstStyle/>
+          <a:p>
+            <a:fld id="{B6F15528-21DE-4FAA-801E-634DDDAF4B2B}" type="slidenum">
+              <a:rPr lang="en-US" smtClean="0"/>
+              <a:pPr/>
+              <a:t>28</a:t>
+            </a:fld>
+            <a:endParaRPr lang="en-US"/>
+          </a:p>
+        </p:txBody>
+      </p:sp>
+      <p:sp>
+        <p:nvSpPr>
+          <p:cNvPr id="6" name="Retângulo 5"/>
+          <p:cNvSpPr/>
+          <p:nvPr/>
+        </p:nvSpPr>
+        <p:spPr>
+          <a:xfrm>
+            <a:off x="662121" y="3075057"/>
+            <a:ext cx="7819769" cy="707886"/>
+          </a:xfrm>
+          <a:prstGeom prst="rect">
+            <a:avLst/>
+          </a:prstGeom>
+        </p:spPr>
+        <p:txBody>
+          <a:bodyPr wrap="none">
+            <a:spAutoFit/>
+          </a:bodyPr>
+          <a:lstStyle/>
+          <a:p>
+            <a:pPr marL="742950" lvl="0" indent="-742950" algn="ctr" fontAlgn="base">
+              <a:buFont typeface="+mj-lt"/>
+              <a:buAutoNum type="arabicPeriod" startAt="5"/>
+            </a:pPr>
+            <a:r>
+              <a:rPr lang="pt-PT" sz="4000" err="1">
+                <a:solidFill>
+                  <a:srgbClr val="262626"/>
+                </a:solidFill>
+                <a:latin typeface="Century Gothic" panose="020B0502020202020204" pitchFamily="34" charset="0"/>
+              </a:rPr>
+              <a:t>Container</a:t>
+            </a:r>
+            <a:r>
+              <a:rPr lang="pt-PT" sz="4000">
+                <a:solidFill>
+                  <a:srgbClr val="262626"/>
+                </a:solidFill>
+                <a:latin typeface="Century Gothic" panose="020B0502020202020204" pitchFamily="34" charset="0"/>
+              </a:rPr>
+              <a:t> </a:t>
+            </a:r>
+            <a:r>
+              <a:rPr lang="pt-PT" sz="4000" err="1">
+                <a:solidFill>
+                  <a:srgbClr val="262626"/>
+                </a:solidFill>
+                <a:latin typeface="Century Gothic" panose="020B0502020202020204" pitchFamily="34" charset="0"/>
+              </a:rPr>
+              <a:t>Metrics</a:t>
+            </a:r>
+            <a:r>
+              <a:rPr lang="pt-PT" sz="4000">
+                <a:solidFill>
+                  <a:srgbClr val="262626"/>
+                </a:solidFill>
+                <a:latin typeface="Century Gothic" panose="020B0502020202020204" pitchFamily="34" charset="0"/>
+              </a:rPr>
+              <a:t> </a:t>
+            </a:r>
+            <a:r>
+              <a:rPr lang="pt-PT" sz="4000" err="1">
+                <a:solidFill>
+                  <a:srgbClr val="262626"/>
+                </a:solidFill>
+                <a:latin typeface="Century Gothic" panose="020B0502020202020204" pitchFamily="34" charset="0"/>
+              </a:rPr>
+              <a:t>Reported</a:t>
+            </a:r>
+            <a:endParaRPr lang="pt-PT" sz="4000">
+              <a:solidFill>
+                <a:srgbClr val="A53010"/>
+              </a:solidFill>
+              <a:latin typeface="Century Gothic" panose="020B0502020202020204" pitchFamily="34" charset="0"/>
+            </a:endParaRPr>
+          </a:p>
+        </p:txBody>
+      </p:sp>
+    </p:spTree>
+    <p:extLst>
+      <p:ext uri="{BB962C8B-B14F-4D97-AF65-F5344CB8AC3E}">
+        <p14:creationId xmlns:p14="http://schemas.microsoft.com/office/powerpoint/2010/main" val="3525021425"/>
+      </p:ext>
+    </p:extLst>
+  </p:cSld>
+  <p:clrMapOvr>
+    <a:masterClrMapping/>
+  </p:clrMapOvr>
+</p:sld>
+</file>
+
+<file path=ppt/slides/slide29.xml><?xml version="1.0" encoding="utf-8"?>
+<p:sld xmlns:a="http://schemas.openxmlformats.org/drawingml/2006/main" xmlns:r="http://schemas.openxmlformats.org/officeDocument/2006/relationships" xmlns:p="http://schemas.openxmlformats.org/presentationml/2006/main">
+  <p:cSld>
+    <p:spTree>
+      <p:nvGrpSpPr>
+        <p:cNvPr id="1" name=""/>
+        <p:cNvGrpSpPr/>
+        <p:nvPr/>
+      </p:nvGrpSpPr>
+      <p:grpSpPr>
+        <a:xfrm>
+          <a:off x="0" y="0"/>
+          <a:ext cx="0" cy="0"/>
+          <a:chOff x="0" y="0"/>
+          <a:chExt cx="0" cy="0"/>
+        </a:xfrm>
+      </p:grpSpPr>
+      <p:sp>
+        <p:nvSpPr>
           <p:cNvPr id="2" name="Marcador de Posição de Conteúdo 1"/>
           <p:cNvSpPr>
             <a:spLocks noGrp="1"/>
@@ -9068,7 +9698,7 @@
             <a:fld id="{B6F15528-21DE-4FAA-801E-634DDDAF4B2B}" type="slidenum">
               <a:rPr lang="en-US" smtClean="0"/>
               <a:pPr/>
-              <a:t>28</a:t>
+              <a:t>29</a:t>
             </a:fld>
             <a:endParaRPr lang="en-US"/>
           </a:p>
@@ -9172,231 +9802,6 @@
 </p:sld>
 </file>
 
-<file path=ppt/slides/slide29.xml><?xml version="1.0" encoding="utf-8"?>
-<p:sld xmlns:a="http://schemas.openxmlformats.org/drawingml/2006/main" xmlns:r="http://schemas.openxmlformats.org/officeDocument/2006/relationships" xmlns:p="http://schemas.openxmlformats.org/presentationml/2006/main">
-  <p:cSld>
-    <p:spTree>
-      <p:nvGrpSpPr>
-        <p:cNvPr id="1" name=""/>
-        <p:cNvGrpSpPr/>
-        <p:nvPr/>
-      </p:nvGrpSpPr>
-      <p:grpSpPr>
-        <a:xfrm>
-          <a:off x="0" y="0"/>
-          <a:ext cx="0" cy="0"/>
-          <a:chOff x="0" y="0"/>
-          <a:chExt cx="0" cy="0"/>
-        </a:xfrm>
-      </p:grpSpPr>
-      <p:sp>
-        <p:nvSpPr>
-          <p:cNvPr id="2" name="Marcador de Posição de Conteúdo 1"/>
-          <p:cNvSpPr>
-            <a:spLocks noGrp="1"/>
-          </p:cNvSpPr>
-          <p:nvPr>
-            <p:ph idx="1"/>
-          </p:nvPr>
-        </p:nvSpPr>
-        <p:spPr/>
-        <p:txBody>
-          <a:bodyPr/>
-          <a:lstStyle/>
-          <a:p>
-            <a:pPr fontAlgn="base">
-              <a:lnSpc>
-                <a:spcPct val="150000"/>
-              </a:lnSpc>
-            </a:pPr>
-            <a:r>
-              <a:rPr lang="en-US" sz="1600"/>
-              <a:t>dockerAPI.py</a:t>
-            </a:r>
-          </a:p>
-          <a:p>
-            <a:pPr lvl="1" fontAlgn="base">
-              <a:lnSpc>
-                <a:spcPct val="150000"/>
-              </a:lnSpc>
-            </a:pPr>
-            <a:r>
-              <a:rPr lang="en-US" sz="1600"/>
-              <a:t>Metrics such as </a:t>
-            </a:r>
-            <a:r>
-              <a:rPr lang="en-US" sz="1600" err="1"/>
-              <a:t>cpu</a:t>
-            </a:r>
-            <a:r>
-              <a:rPr lang="en-US" sz="1600"/>
-              <a:t> values, memory usage and disk accesses are collected;</a:t>
-            </a:r>
-          </a:p>
-          <a:p>
-            <a:pPr lvl="1" fontAlgn="base">
-              <a:lnSpc>
-                <a:spcPct val="150000"/>
-              </a:lnSpc>
-            </a:pPr>
-            <a:r>
-              <a:rPr lang="en-US" sz="1600"/>
-              <a:t>It sends these metrics in a format of </a:t>
-            </a:r>
-            <a:r>
-              <a:rPr lang="en-US" sz="1600" err="1"/>
-              <a:t>json</a:t>
-            </a:r>
-            <a:r>
-              <a:rPr lang="en-US" sz="1600"/>
-              <a:t> to TMA-Monitor;</a:t>
-            </a:r>
-          </a:p>
-          <a:p>
-            <a:pPr lvl="1" fontAlgn="base">
-              <a:lnSpc>
-                <a:spcPct val="150000"/>
-              </a:lnSpc>
-            </a:pPr>
-            <a:r>
-              <a:rPr lang="en-US" sz="1600"/>
-              <a:t>The format of the messages respects the schema of this project.</a:t>
-            </a:r>
-          </a:p>
-          <a:p>
-            <a:pPr fontAlgn="base">
-              <a:lnSpc>
-                <a:spcPct val="150000"/>
-              </a:lnSpc>
-            </a:pPr>
-            <a:r>
-              <a:rPr lang="en-US" sz="1600"/>
-              <a:t>message.py</a:t>
-            </a:r>
-          </a:p>
-          <a:p>
-            <a:pPr lvl="1" fontAlgn="base">
-              <a:lnSpc>
-                <a:spcPct val="150000"/>
-              </a:lnSpc>
-            </a:pPr>
-            <a:r>
-              <a:rPr lang="en-US" sz="1600"/>
-              <a:t>Builds the message to send to Monitor API.</a:t>
-            </a:r>
-          </a:p>
-          <a:p>
-            <a:pPr marL="0" indent="0">
-              <a:buNone/>
-            </a:pPr>
-            <a:endParaRPr lang="pt-PT"/>
-          </a:p>
-        </p:txBody>
-      </p:sp>
-      <p:sp>
-        <p:nvSpPr>
-          <p:cNvPr id="3" name="Marcador de Posição da Data 2"/>
-          <p:cNvSpPr>
-            <a:spLocks noGrp="1"/>
-          </p:cNvSpPr>
-          <p:nvPr>
-            <p:ph type="dt" sz="half" idx="10"/>
-          </p:nvPr>
-        </p:nvSpPr>
-        <p:spPr/>
-        <p:txBody>
-          <a:bodyPr/>
-          <a:lstStyle/>
-          <a:p>
-            <a:fld id="{AF01AAA2-2263-4F56-8B2F-28186D5621FD}" type="datetime1">
-              <a:rPr lang="en-US" smtClean="0"/>
-              <a:t>9/17/18</a:t>
-            </a:fld>
-            <a:endParaRPr lang="en-US"/>
-          </a:p>
-        </p:txBody>
-      </p:sp>
-      <p:sp>
-        <p:nvSpPr>
-          <p:cNvPr id="4" name="Marcador de Posição do Número do Diapositivo 3"/>
-          <p:cNvSpPr>
-            <a:spLocks noGrp="1"/>
-          </p:cNvSpPr>
-          <p:nvPr>
-            <p:ph type="sldNum" sz="quarter" idx="12"/>
-          </p:nvPr>
-        </p:nvSpPr>
-        <p:spPr/>
-        <p:txBody>
-          <a:bodyPr/>
-          <a:lstStyle/>
-          <a:p>
-            <a:fld id="{B6F15528-21DE-4FAA-801E-634DDDAF4B2B}" type="slidenum">
-              <a:rPr lang="en-US" smtClean="0"/>
-              <a:pPr/>
-              <a:t>29</a:t>
-            </a:fld>
-            <a:endParaRPr lang="en-US"/>
-          </a:p>
-        </p:txBody>
-      </p:sp>
-      <p:sp>
-        <p:nvSpPr>
-          <p:cNvPr id="6" name="Título 4"/>
-          <p:cNvSpPr>
-            <a:spLocks noGrp="1"/>
-          </p:cNvSpPr>
-          <p:nvPr>
-            <p:ph type="title"/>
-          </p:nvPr>
-        </p:nvSpPr>
-        <p:spPr>
-          <a:xfrm>
-            <a:off x="4532395" y="399177"/>
-            <a:ext cx="3537908" cy="365527"/>
-          </a:xfrm>
-        </p:spPr>
-        <p:txBody>
-          <a:bodyPr/>
-          <a:lstStyle/>
-          <a:p>
-            <a:r>
-              <a:rPr lang="pt-PT" err="1"/>
-              <a:t>Container</a:t>
-            </a:r>
-            <a:r>
-              <a:rPr lang="pt-PT"/>
-              <a:t> </a:t>
-            </a:r>
-            <a:r>
-              <a:rPr lang="pt-PT" err="1"/>
-              <a:t>Metrics</a:t>
-            </a:r>
-            <a:r>
-              <a:rPr lang="pt-PT"/>
-              <a:t> </a:t>
-            </a:r>
-            <a:r>
-              <a:rPr lang="pt-PT" err="1"/>
-              <a:t>Reported</a:t>
-            </a:r>
-            <a:endParaRPr lang="pt-PT"/>
-          </a:p>
-        </p:txBody>
-      </p:sp>
-    </p:spTree>
-    <p:extLst>
-      <p:ext uri="{BB962C8B-B14F-4D97-AF65-F5344CB8AC3E}">
-        <p14:creationId xmlns:p14="http://schemas.microsoft.com/office/powerpoint/2010/main" val="3163480084"/>
-      </p:ext>
-    </p:extLst>
-  </p:cSld>
-  <p:clrMapOvr>
-    <a:masterClrMapping/>
-  </p:clrMapOvr>
-</p:sld>
-</file>
-
 <file path=ppt/slides/slide3.xml><?xml version="1.0" encoding="utf-8"?>
 <p:sld xmlns:a="http://schemas.openxmlformats.org/drawingml/2006/main" xmlns:r="http://schemas.openxmlformats.org/officeDocument/2006/relationships" xmlns:p="http://schemas.openxmlformats.org/presentationml/2006/main">
   <p:cSld>
@@ -9575,7 +9980,7 @@
             </a:pPr>
             <a:r>
               <a:rPr lang="en-US" sz="1600"/>
-              <a:t>data.py</a:t>
+              <a:t>dockerAPI.py</a:t>
             </a:r>
           </a:p>
           <a:p>
@@ -9586,15 +9991,45 @@
             </a:pPr>
             <a:r>
               <a:rPr lang="en-US" sz="1600"/>
-              <a:t>Class that represents data object of schema, specifies its type, </a:t>
+              <a:t>Metrics such as </a:t>
             </a:r>
             <a:r>
               <a:rPr lang="en-US" sz="1600" err="1"/>
-              <a:t>descriptionId</a:t>
+              <a:t>cpu</a:t>
             </a:r>
             <a:r>
               <a:rPr lang="en-US" sz="1600"/>
-              <a:t> and observations.</a:t>
+              <a:t> values, memory usage and disk accesses are collected;</a:t>
+            </a:r>
+          </a:p>
+          <a:p>
+            <a:pPr lvl="1" fontAlgn="base">
+              <a:lnSpc>
+                <a:spcPct val="150000"/>
+              </a:lnSpc>
+            </a:pPr>
+            <a:r>
+              <a:rPr lang="en-US" sz="1600"/>
+              <a:t>It sends these metrics in a format of </a:t>
+            </a:r>
+            <a:r>
+              <a:rPr lang="en-US" sz="1600" err="1"/>
+              <a:t>json</a:t>
+            </a:r>
+            <a:r>
+              <a:rPr lang="en-US" sz="1600"/>
+              <a:t> to TMA-Monitor;</a:t>
+            </a:r>
+          </a:p>
+          <a:p>
+            <a:pPr lvl="1" fontAlgn="base">
+              <a:lnSpc>
+                <a:spcPct val="150000"/>
+              </a:lnSpc>
+            </a:pPr>
+            <a:r>
+              <a:rPr lang="en-US" sz="1600"/>
+              <a:t>The format of the messages respects the schema of this project.</a:t>
             </a:r>
           </a:p>
           <a:p>
@@ -9605,7 +10040,7 @@
             </a:pPr>
             <a:r>
               <a:rPr lang="en-US" sz="1600"/>
-              <a:t>observation.py</a:t>
+              <a:t>message.py</a:t>
             </a:r>
           </a:p>
           <a:p>
@@ -9616,8 +10051,14 @@
             </a:pPr>
             <a:r>
               <a:rPr lang="en-US" sz="1600"/>
-              <a:t>Constructs observation object with values of time (timestamp) and value.</a:t>
-            </a:r>
+              <a:t>Builds the message to send to Monitor API.</a:t>
+            </a:r>
+          </a:p>
+          <a:p>
+            <a:pPr marL="0" indent="0">
+              <a:buNone/>
+            </a:pPr>
+            <a:endParaRPr lang="pt-PT"/>
           </a:p>
         </p:txBody>
       </p:sp>
@@ -9636,7 +10077,7 @@
           <a:bodyPr/>
           <a:lstStyle/>
           <a:p>
-            <a:fld id="{1686ABD0-C272-4E4D-B8CF-7551C55D4F4E}" type="datetime1">
+            <a:fld id="{AF01AAA2-2263-4F56-8B2F-28186D5621FD}" type="datetime1">
               <a:rPr lang="en-US" smtClean="0"/>
               <a:t>9/17/18</a:t>
             </a:fld>
@@ -9681,7 +10122,7 @@
         <p:spPr>
           <a:xfrm>
             <a:off x="4532395" y="399177"/>
-            <a:ext cx="3527611" cy="365527"/>
+            <a:ext cx="3537908" cy="365527"/>
           </a:xfrm>
         </p:spPr>
         <p:txBody>
@@ -9715,7 +10156,7 @@
     </p:spTree>
     <p:extLst>
       <p:ext uri="{BB962C8B-B14F-4D97-AF65-F5344CB8AC3E}">
-        <p14:creationId xmlns:p14="http://schemas.microsoft.com/office/powerpoint/2010/main" val="653218176"/>
+        <p14:creationId xmlns:p14="http://schemas.microsoft.com/office/powerpoint/2010/main" val="3163480084"/>
       </p:ext>
     </p:extLst>
   </p:cSld>
@@ -9754,6 +10195,195 @@
         </p:nvSpPr>
         <p:spPr/>
         <p:txBody>
+          <a:bodyPr/>
+          <a:lstStyle/>
+          <a:p>
+            <a:pPr fontAlgn="base">
+              <a:lnSpc>
+                <a:spcPct val="150000"/>
+              </a:lnSpc>
+            </a:pPr>
+            <a:r>
+              <a:rPr lang="en-US" sz="1600"/>
+              <a:t>data.py</a:t>
+            </a:r>
+          </a:p>
+          <a:p>
+            <a:pPr lvl="1" fontAlgn="base">
+              <a:lnSpc>
+                <a:spcPct val="150000"/>
+              </a:lnSpc>
+            </a:pPr>
+            <a:r>
+              <a:rPr lang="en-US" sz="1600"/>
+              <a:t>Class that represents data object of schema, specifies its type, </a:t>
+            </a:r>
+            <a:r>
+              <a:rPr lang="en-US" sz="1600" err="1"/>
+              <a:t>descriptionId</a:t>
+            </a:r>
+            <a:r>
+              <a:rPr lang="en-US" sz="1600"/>
+              <a:t> and observations.</a:t>
+            </a:r>
+          </a:p>
+          <a:p>
+            <a:pPr fontAlgn="base">
+              <a:lnSpc>
+                <a:spcPct val="150000"/>
+              </a:lnSpc>
+            </a:pPr>
+            <a:r>
+              <a:rPr lang="en-US" sz="1600"/>
+              <a:t>observation.py</a:t>
+            </a:r>
+          </a:p>
+          <a:p>
+            <a:pPr lvl="1" fontAlgn="base">
+              <a:lnSpc>
+                <a:spcPct val="150000"/>
+              </a:lnSpc>
+            </a:pPr>
+            <a:r>
+              <a:rPr lang="en-US" sz="1600"/>
+              <a:t>Constructs observation object with values of time (timestamp) and value.</a:t>
+            </a:r>
+          </a:p>
+        </p:txBody>
+      </p:sp>
+      <p:sp>
+        <p:nvSpPr>
+          <p:cNvPr id="3" name="Marcador de Posição da Data 2"/>
+          <p:cNvSpPr>
+            <a:spLocks noGrp="1"/>
+          </p:cNvSpPr>
+          <p:nvPr>
+            <p:ph type="dt" sz="half" idx="10"/>
+          </p:nvPr>
+        </p:nvSpPr>
+        <p:spPr/>
+        <p:txBody>
+          <a:bodyPr/>
+          <a:lstStyle/>
+          <a:p>
+            <a:fld id="{1686ABD0-C272-4E4D-B8CF-7551C55D4F4E}" type="datetime1">
+              <a:rPr lang="en-US" smtClean="0"/>
+              <a:t>9/17/18</a:t>
+            </a:fld>
+            <a:endParaRPr lang="en-US"/>
+          </a:p>
+        </p:txBody>
+      </p:sp>
+      <p:sp>
+        <p:nvSpPr>
+          <p:cNvPr id="4" name="Marcador de Posição do Número do Diapositivo 3"/>
+          <p:cNvSpPr>
+            <a:spLocks noGrp="1"/>
+          </p:cNvSpPr>
+          <p:nvPr>
+            <p:ph type="sldNum" sz="quarter" idx="12"/>
+          </p:nvPr>
+        </p:nvSpPr>
+        <p:spPr/>
+        <p:txBody>
+          <a:bodyPr/>
+          <a:lstStyle/>
+          <a:p>
+            <a:fld id="{B6F15528-21DE-4FAA-801E-634DDDAF4B2B}" type="slidenum">
+              <a:rPr lang="en-US" smtClean="0"/>
+              <a:pPr/>
+              <a:t>31</a:t>
+            </a:fld>
+            <a:endParaRPr lang="en-US"/>
+          </a:p>
+        </p:txBody>
+      </p:sp>
+      <p:sp>
+        <p:nvSpPr>
+          <p:cNvPr id="6" name="Título 4"/>
+          <p:cNvSpPr>
+            <a:spLocks noGrp="1"/>
+          </p:cNvSpPr>
+          <p:nvPr>
+            <p:ph type="title"/>
+          </p:nvPr>
+        </p:nvSpPr>
+        <p:spPr>
+          <a:xfrm>
+            <a:off x="4532395" y="399177"/>
+            <a:ext cx="3527611" cy="365527"/>
+          </a:xfrm>
+        </p:spPr>
+        <p:txBody>
+          <a:bodyPr/>
+          <a:lstStyle/>
+          <a:p>
+            <a:r>
+              <a:rPr lang="pt-PT" err="1"/>
+              <a:t>Container</a:t>
+            </a:r>
+            <a:r>
+              <a:rPr lang="pt-PT"/>
+              <a:t> </a:t>
+            </a:r>
+            <a:r>
+              <a:rPr lang="pt-PT" err="1"/>
+              <a:t>Metrics</a:t>
+            </a:r>
+            <a:r>
+              <a:rPr lang="pt-PT"/>
+              <a:t> </a:t>
+            </a:r>
+            <a:r>
+              <a:rPr lang="pt-PT" err="1"/>
+              <a:t>Reported</a:t>
+            </a:r>
+            <a:endParaRPr lang="pt-PT"/>
+          </a:p>
+        </p:txBody>
+      </p:sp>
+    </p:spTree>
+    <p:extLst>
+      <p:ext uri="{BB962C8B-B14F-4D97-AF65-F5344CB8AC3E}">
+        <p14:creationId xmlns:p14="http://schemas.microsoft.com/office/powerpoint/2010/main" val="653218176"/>
+      </p:ext>
+    </p:extLst>
+  </p:cSld>
+  <p:clrMapOvr>
+    <a:masterClrMapping/>
+  </p:clrMapOvr>
+</p:sld>
+</file>
+
+<file path=ppt/slides/slide32.xml><?xml version="1.0" encoding="utf-8"?>
+<p:sld xmlns:a="http://schemas.openxmlformats.org/drawingml/2006/main" xmlns:r="http://schemas.openxmlformats.org/officeDocument/2006/relationships" xmlns:p="http://schemas.openxmlformats.org/presentationml/2006/main">
+  <p:cSld>
+    <p:spTree>
+      <p:nvGrpSpPr>
+        <p:cNvPr id="1" name=""/>
+        <p:cNvGrpSpPr/>
+        <p:nvPr/>
+      </p:nvGrpSpPr>
+      <p:grpSpPr>
+        <a:xfrm>
+          <a:off x="0" y="0"/>
+          <a:ext cx="0" cy="0"/>
+          <a:chOff x="0" y="0"/>
+          <a:chExt cx="0" cy="0"/>
+        </a:xfrm>
+      </p:grpSpPr>
+      <p:sp>
+        <p:nvSpPr>
+          <p:cNvPr id="2" name="Marcador de Posição de Conteúdo 1"/>
+          <p:cNvSpPr>
+            <a:spLocks noGrp="1"/>
+          </p:cNvSpPr>
+          <p:nvPr>
+            <p:ph idx="1"/>
+          </p:nvPr>
+        </p:nvSpPr>
+        <p:spPr/>
+        <p:txBody>
           <a:bodyPr>
             <a:normAutofit/>
           </a:bodyPr>
@@ -9909,7 +10539,7 @@
             <a:fld id="{B6F15528-21DE-4FAA-801E-634DDDAF4B2B}" type="slidenum">
               <a:rPr lang="en-US" smtClean="0"/>
               <a:pPr/>
-              <a:t>31</a:t>
+              <a:t>32</a:t>
             </a:fld>
             <a:endParaRPr lang="en-US"/>
           </a:p>
@@ -10054,7 +10684,7 @@
 </p:sld>
 </file>
 
-<file path=ppt/slides/slide32.xml><?xml version="1.0" encoding="utf-8"?>
+<file path=ppt/slides/slide33.xml><?xml version="1.0" encoding="utf-8"?>
 <p:sld xmlns:a="http://schemas.openxmlformats.org/drawingml/2006/main" xmlns:r="http://schemas.openxmlformats.org/officeDocument/2006/relationships" xmlns:p="http://schemas.openxmlformats.org/presentationml/2006/main">
   <p:cSld>
     <p:spTree>
@@ -10250,7 +10880,7 @@
             <a:fld id="{B6F15528-21DE-4FAA-801E-634DDDAF4B2B}" type="slidenum">
               <a:rPr lang="en-US" smtClean="0"/>
               <a:pPr/>
-              <a:t>32</a:t>
+              <a:t>33</a:t>
             </a:fld>
             <a:endParaRPr lang="en-US"/>
           </a:p>
@@ -10395,7 +11025,7 @@
 </p:sld>
 </file>
 
-<file path=ppt/slides/slide33.xml><?xml version="1.0" encoding="utf-8"?>
+<file path=ppt/slides/slide34.xml><?xml version="1.0" encoding="utf-8"?>
 <p:sld xmlns:a="http://schemas.openxmlformats.org/drawingml/2006/main" xmlns:r="http://schemas.openxmlformats.org/officeDocument/2006/relationships" xmlns:p="http://schemas.openxmlformats.org/presentationml/2006/main">
   <p:cSld>
     <p:spTree>
@@ -10453,7 +11083,7 @@
             <a:fld id="{B6F15528-21DE-4FAA-801E-634DDDAF4B2B}" type="slidenum">
               <a:rPr lang="en-US" smtClean="0"/>
               <a:pPr/>
-              <a:t>33</a:t>
+              <a:t>34</a:t>
             </a:fld>
             <a:endParaRPr lang="en-US"/>
           </a:p>
@@ -10598,7 +11228,7 @@
 </p:sld>
 </file>
 
-<file path=ppt/slides/slide34.xml><?xml version="1.0" encoding="utf-8"?>
+<file path=ppt/slides/slide35.xml><?xml version="1.0" encoding="utf-8"?>
 <p:sld xmlns:a="http://schemas.openxmlformats.org/drawingml/2006/main" xmlns:r="http://schemas.openxmlformats.org/officeDocument/2006/relationships" xmlns:p="http://schemas.openxmlformats.org/presentationml/2006/main">
   <p:cSld>
     <p:bg>

</xml_diff>

<commit_message>
Fixing the path of the monitor
</commit_message>
<xml_diff>
--- a/documents/ATMOSPHERE_TMA_Framework_usage.pptx
+++ b/documents/ATMOSPHERE_TMA_Framework_usage.pptx
@@ -286,6 +286,45 @@
     </pc:docChg>
   </pc:docChgLst>
   <pc:docChgLst>
+    <pc:chgData name="Utilizador Convidado" providerId="Windows Live" clId="Web-{566E6ACB-294A-440D-A928-836B46D2CF0B}"/>
+    <pc:docChg chg="modSld">
+      <pc:chgData name="Utilizador Convidado" userId="" providerId="Windows Live" clId="Web-{566E6ACB-294A-440D-A928-836B46D2CF0B}" dt="2018-09-14T15:45:33.041" v="11" actId="20577"/>
+      <pc:docMkLst>
+        <pc:docMk/>
+      </pc:docMkLst>
+      <pc:sldChg chg="modSp">
+        <pc:chgData name="Utilizador Convidado" userId="" providerId="Windows Live" clId="Web-{566E6ACB-294A-440D-A928-836B46D2CF0B}" dt="2018-09-14T15:45:03.197" v="7" actId="20577"/>
+        <pc:sldMkLst>
+          <pc:docMk/>
+          <pc:sldMk cId="1929921646" sldId="262"/>
+        </pc:sldMkLst>
+        <pc:spChg chg="mod">
+          <ac:chgData name="Utilizador Convidado" userId="" providerId="Windows Live" clId="Web-{566E6ACB-294A-440D-A928-836B46D2CF0B}" dt="2018-09-14T15:45:03.197" v="7" actId="20577"/>
+          <ac:spMkLst>
+            <pc:docMk/>
+            <pc:sldMk cId="1929921646" sldId="262"/>
+            <ac:spMk id="4" creationId="{00000000-0000-0000-0000-000000000000}"/>
+          </ac:spMkLst>
+        </pc:spChg>
+      </pc:sldChg>
+      <pc:sldChg chg="modSp">
+        <pc:chgData name="Utilizador Convidado" userId="" providerId="Windows Live" clId="Web-{566E6ACB-294A-440D-A928-836B46D2CF0B}" dt="2018-09-14T15:45:33.041" v="10" actId="20577"/>
+        <pc:sldMkLst>
+          <pc:docMk/>
+          <pc:sldMk cId="3350067708" sldId="269"/>
+        </pc:sldMkLst>
+        <pc:spChg chg="mod">
+          <ac:chgData name="Utilizador Convidado" userId="" providerId="Windows Live" clId="Web-{566E6ACB-294A-440D-A928-836B46D2CF0B}" dt="2018-09-14T15:45:33.041" v="10" actId="20577"/>
+          <ac:spMkLst>
+            <pc:docMk/>
+            <pc:sldMk cId="3350067708" sldId="269"/>
+            <ac:spMk id="7" creationId="{00000000-0000-0000-0000-000000000000}"/>
+          </ac:spMkLst>
+        </pc:spChg>
+      </pc:sldChg>
+    </pc:docChg>
+  </pc:docChgLst>
+  <pc:docChgLst>
     <pc:chgData name="Rui Silva" userId="983dbe091f6df825" providerId="Windows Live" clId="Web-{A22F9900-BDA3-480D-9150-FFCC842C65CF}"/>
     <pc:docChg chg="modSld">
       <pc:chgData name="Rui Silva" userId="983dbe091f6df825" providerId="Windows Live" clId="Web-{A22F9900-BDA3-480D-9150-FFCC842C65CF}" dt="2018-09-12T16:15:58.881" v="28" actId="20577"/>
@@ -449,45 +488,6 @@
             <pc:docMk/>
             <pc:sldMk cId="530664432" sldId="296"/>
             <ac:spMk id="6" creationId="{00000000-0000-0000-0000-000000000000}"/>
-          </ac:spMkLst>
-        </pc:spChg>
-      </pc:sldChg>
-    </pc:docChg>
-  </pc:docChgLst>
-  <pc:docChgLst>
-    <pc:chgData name="Utilizador Convidado" providerId="Windows Live" clId="Web-{566E6ACB-294A-440D-A928-836B46D2CF0B}"/>
-    <pc:docChg chg="modSld">
-      <pc:chgData name="Utilizador Convidado" userId="" providerId="Windows Live" clId="Web-{566E6ACB-294A-440D-A928-836B46D2CF0B}" dt="2018-09-14T15:45:33.041" v="11" actId="20577"/>
-      <pc:docMkLst>
-        <pc:docMk/>
-      </pc:docMkLst>
-      <pc:sldChg chg="modSp">
-        <pc:chgData name="Utilizador Convidado" userId="" providerId="Windows Live" clId="Web-{566E6ACB-294A-440D-A928-836B46D2CF0B}" dt="2018-09-14T15:45:03.197" v="7" actId="20577"/>
-        <pc:sldMkLst>
-          <pc:docMk/>
-          <pc:sldMk cId="1929921646" sldId="262"/>
-        </pc:sldMkLst>
-        <pc:spChg chg="mod">
-          <ac:chgData name="Utilizador Convidado" userId="" providerId="Windows Live" clId="Web-{566E6ACB-294A-440D-A928-836B46D2CF0B}" dt="2018-09-14T15:45:03.197" v="7" actId="20577"/>
-          <ac:spMkLst>
-            <pc:docMk/>
-            <pc:sldMk cId="1929921646" sldId="262"/>
-            <ac:spMk id="4" creationId="{00000000-0000-0000-0000-000000000000}"/>
-          </ac:spMkLst>
-        </pc:spChg>
-      </pc:sldChg>
-      <pc:sldChg chg="modSp">
-        <pc:chgData name="Utilizador Convidado" userId="" providerId="Windows Live" clId="Web-{566E6ACB-294A-440D-A928-836B46D2CF0B}" dt="2018-09-14T15:45:33.041" v="10" actId="20577"/>
-        <pc:sldMkLst>
-          <pc:docMk/>
-          <pc:sldMk cId="3350067708" sldId="269"/>
-        </pc:sldMkLst>
-        <pc:spChg chg="mod">
-          <ac:chgData name="Utilizador Convidado" userId="" providerId="Windows Live" clId="Web-{566E6ACB-294A-440D-A928-836B46D2CF0B}" dt="2018-09-14T15:45:33.041" v="10" actId="20577"/>
-          <ac:spMkLst>
-            <pc:docMk/>
-            <pc:sldMk cId="3350067708" sldId="269"/>
-            <ac:spMk id="7" creationId="{00000000-0000-0000-0000-000000000000}"/>
           </ac:spMkLst>
         </pc:spChg>
       </pc:sldChg>
@@ -4711,7 +4711,7 @@
               <a:buNone/>
             </a:pPr>
             <a:r>
-              <a:rPr lang="pt-PT"/>
+              <a:rPr lang="pt-PT" dirty="0"/>
               <a:t>        </a:t>
             </a:r>
           </a:p>
@@ -4720,23 +4720,23 @@
               <a:buNone/>
             </a:pPr>
             <a:r>
-              <a:rPr lang="pt-PT"/>
+              <a:rPr lang="pt-PT" dirty="0"/>
               <a:t>	</a:t>
             </a:r>
             <a:r>
-              <a:rPr lang="pt-PT">
+              <a:rPr lang="pt-PT" dirty="0">
                 <a:hlinkClick r:id="rId2"/>
               </a:rPr>
               <a:t>https://monitor-server-0.monitor-server.default.svc.cluster.local:5000/monitor</a:t>
             </a:r>
             <a:r>
-              <a:rPr lang="pt-PT"/>
+              <a:rPr lang="pt-PT" dirty="0"/>
               <a:t> </a:t>
             </a:r>
           </a:p>
           <a:p>
             <a:pPr fontAlgn="base"/>
-            <a:endParaRPr lang="en-US" sz="1600"/>
+            <a:endParaRPr lang="en-US" sz="1600" dirty="0"/>
           </a:p>
           <a:p>
             <a:pPr fontAlgn="base"/>
@@ -4754,11 +4754,11 @@
           </a:p>
           <a:p>
             <a:pPr lvl="1" fontAlgn="base"/>
-            <a:endParaRPr lang="en-US" sz="1600"/>
+            <a:endParaRPr lang="en-US" sz="1600" dirty="0"/>
           </a:p>
           <a:p>
             <a:pPr lvl="1" fontAlgn="base"/>
-            <a:endParaRPr lang="en-US" sz="1600"/>
+            <a:endParaRPr lang="en-US" sz="1600" dirty="0"/>
           </a:p>
           <a:p>
             <a:pPr fontAlgn="base"/>
@@ -4769,40 +4769,41 @@
           </a:p>
           <a:p>
             <a:pPr fontAlgn="base"/>
-            <a:endParaRPr lang="en-US" sz="1600" u="sng"/>
-          </a:p>
-          <a:p>
-            <a:pPr marL="1828800" lvl="4" indent="0" algn="just" fontAlgn="base">
+            <a:endParaRPr lang="en-US" sz="1600">
+              <a:hlinkClick r:id="rId3"/>
+            </a:endParaRPr>
+          </a:p>
+          <a:p>
+            <a:pPr marL="0" indent="0" algn="ctr" fontAlgn="base">
               <a:buNone/>
             </a:pPr>
-            <a:r>
-              <a:rPr lang="en-US" sz="1600"/>
-              <a:t>               </a:t>
-            </a:r>
             <a:r>
               <a:rPr lang="en-US" sz="1600">
                 <a:hlinkClick r:id="rId3"/>
               </a:rPr>
-              <a:t>https://10.244.1.12:5000/monitor</a:t>
-            </a:r>
-            <a:r>
-              <a:rPr lang="en-US" sz="1600"/>
-              <a:t>  </a:t>
-            </a:r>
+              <a:t>https</a:t>
+            </a:r>
+            <a:r>
+              <a:rPr lang="en-US" sz="1600" dirty="0">
+                <a:hlinkClick r:id="rId3"/>
+              </a:rPr>
+              <a:t>://10.100.166.233:5000/monitor</a:t>
+            </a:r>
+            <a:endParaRPr lang="en-US" sz="1600" dirty="0"/>
           </a:p>
           <a:p>
             <a:pPr fontAlgn="base"/>
-            <a:endParaRPr lang="en-US" sz="1600"/>
+            <a:endParaRPr lang="en-US" sz="1600" dirty="0"/>
           </a:p>
           <a:p>
             <a:pPr marL="457200" lvl="1" indent="0" fontAlgn="base">
               <a:buNone/>
             </a:pPr>
-            <a:endParaRPr lang="pt-PT"/>
+            <a:endParaRPr lang="pt-PT" dirty="0"/>
           </a:p>
           <a:p>
             <a:pPr fontAlgn="base"/>
-            <a:endParaRPr lang="pt-PT"/>
+            <a:endParaRPr lang="pt-PT" dirty="0"/>
           </a:p>
         </p:txBody>
       </p:sp>

</xml_diff>